<commit_message>
Gantt şemasında yazım düzenlemesi
</commit_message>
<xml_diff>
--- a/EHotel Fizibilite Sunumu.pptx
+++ b/EHotel Fizibilite Sunumu.pptx
@@ -21244,10 +21244,10 @@
       </p:sp>
       <p:pic>
         <p:nvPicPr>
-          <p:cNvPr id="21" name="Resim 20">
+          <p:cNvPr id="3" name="Resim 2">
             <a:extLst>
               <a:ext uri="{FF2B5EF4-FFF2-40B4-BE49-F238E27FC236}">
-                <a16:creationId xmlns:a16="http://schemas.microsoft.com/office/drawing/2014/main" id="{FC173DE7-5645-1253-FAE2-727EF8A2C4FD}"/>
+                <a16:creationId xmlns:a16="http://schemas.microsoft.com/office/drawing/2014/main" id="{828CBCF5-CB16-5AE0-1DC3-E5842B855DC3}"/>
               </a:ext>
             </a:extLst>
           </p:cNvPr>
@@ -21264,8 +21264,8 @@
         </p:blipFill>
         <p:spPr>
           <a:xfrm>
-            <a:off x="2945" y="-4157"/>
-            <a:ext cx="11647146" cy="6858000"/>
+            <a:off x="0" y="4157"/>
+            <a:ext cx="11687578" cy="6858000"/>
           </a:xfrm>
           <a:prstGeom prst="rect">
             <a:avLst/>
@@ -21400,7 +21400,7 @@
               </a:spcAft>
             </a:pPr>
             <a:r>
-              <a:rPr lang="tr-TR" noProof="0" dirty="0"/>
+              <a:rPr lang="tr-TR" noProof="0"/>
               <a:t>Barış Keskin</a:t>
             </a:r>
           </a:p>
@@ -25522,12 +25522,12 @@
 </file>
 
 <file path=customXml/item1.xml><?xml version="1.0" encoding="utf-8"?>
-<p:properties xmlns:p="http://schemas.microsoft.com/office/2006/metadata/properties" xmlns:xsi="http://www.w3.org/2001/XMLSchema-instance" xmlns:pc="http://schemas.microsoft.com/office/infopath/2007/PartnerControls">
-  <documentManagement>
-    <Status xmlns="71af3243-3dd4-4a8d-8c0d-dd76da1f02a5">Not started</Status>
-    <MediaServiceKeyPoints xmlns="71af3243-3dd4-4a8d-8c0d-dd76da1f02a5" xsi:nil="true"/>
-  </documentManagement>
-</p:properties>
+<?mso-contentType ?>
+<FormTemplates xmlns="http://schemas.microsoft.com/sharepoint/v3/contenttype/forms">
+  <Display>DocumentLibraryForm</Display>
+  <Edit>DocumentLibraryForm</Edit>
+  <New>DocumentLibraryForm</New>
+</FormTemplates>
 </file>
 
 <file path=customXml/item2.xml><?xml version="1.0" encoding="utf-8"?>
@@ -25752,27 +25752,18 @@
 </file>
 
 <file path=customXml/item3.xml><?xml version="1.0" encoding="utf-8"?>
-<?mso-contentType ?>
-<FormTemplates xmlns="http://schemas.microsoft.com/sharepoint/v3/contenttype/forms">
-  <Display>DocumentLibraryForm</Display>
-  <Edit>DocumentLibraryForm</Edit>
-  <New>DocumentLibraryForm</New>
-</FormTemplates>
+<p:properties xmlns:p="http://schemas.microsoft.com/office/2006/metadata/properties" xmlns:xsi="http://www.w3.org/2001/XMLSchema-instance" xmlns:pc="http://schemas.microsoft.com/office/infopath/2007/PartnerControls">
+  <documentManagement>
+    <Status xmlns="71af3243-3dd4-4a8d-8c0d-dd76da1f02a5">Not started</Status>
+    <MediaServiceKeyPoints xmlns="71af3243-3dd4-4a8d-8c0d-dd76da1f02a5" xsi:nil="true"/>
+  </documentManagement>
+</p:properties>
 </file>
 
 <file path=customXml/itemProps1.xml><?xml version="1.0" encoding="utf-8"?>
-<ds:datastoreItem xmlns:ds="http://schemas.openxmlformats.org/officeDocument/2006/customXml" ds:itemID="{99919F73-B6C2-4A43-95E2-833EC48925FE}">
+<ds:datastoreItem xmlns:ds="http://schemas.openxmlformats.org/officeDocument/2006/customXml" ds:itemID="{3C8E00D1-8EA3-4E42-801D-0253E1EAFC21}">
   <ds:schemaRefs>
-    <ds:schemaRef ds:uri="16c05727-aa75-4e4a-9b5f-8a80a1165891"/>
-    <ds:schemaRef ds:uri="71af3243-3dd4-4a8d-8c0d-dd76da1f02a5"/>
-    <ds:schemaRef ds:uri="http://purl.org/dc/dcmitype/"/>
-    <ds:schemaRef ds:uri="http://purl.org/dc/elements/1.1/"/>
-    <ds:schemaRef ds:uri="http://purl.org/dc/terms/"/>
-    <ds:schemaRef ds:uri="http://schemas.microsoft.com/office/2006/documentManagement/types"/>
-    <ds:schemaRef ds:uri="http://schemas.microsoft.com/office/2006/metadata/properties"/>
-    <ds:schemaRef ds:uri="http://schemas.microsoft.com/office/infopath/2007/PartnerControls"/>
-    <ds:schemaRef ds:uri="http://schemas.openxmlformats.org/package/2006/metadata/core-properties"/>
-    <ds:schemaRef ds:uri="http://www.w3.org/XML/1998/namespace"/>
+    <ds:schemaRef ds:uri="http://schemas.microsoft.com/sharepoint/v3/contenttype/forms"/>
   </ds:schemaRefs>
 </ds:datastoreItem>
 </file>
@@ -25797,9 +25788,18 @@
 </file>
 
 <file path=customXml/itemProps3.xml><?xml version="1.0" encoding="utf-8"?>
-<ds:datastoreItem xmlns:ds="http://schemas.openxmlformats.org/officeDocument/2006/customXml" ds:itemID="{3C8E00D1-8EA3-4E42-801D-0253E1EAFC21}">
+<ds:datastoreItem xmlns:ds="http://schemas.openxmlformats.org/officeDocument/2006/customXml" ds:itemID="{99919F73-B6C2-4A43-95E2-833EC48925FE}">
   <ds:schemaRefs>
-    <ds:schemaRef ds:uri="http://schemas.microsoft.com/sharepoint/v3/contenttype/forms"/>
+    <ds:schemaRef ds:uri="http://purl.org/dc/terms/"/>
+    <ds:schemaRef ds:uri="http://schemas.microsoft.com/office/infopath/2007/PartnerControls"/>
+    <ds:schemaRef ds:uri="http://schemas.openxmlformats.org/package/2006/metadata/core-properties"/>
+    <ds:schemaRef ds:uri="http://schemas.microsoft.com/office/2006/documentManagement/types"/>
+    <ds:schemaRef ds:uri="16c05727-aa75-4e4a-9b5f-8a80a1165891"/>
+    <ds:schemaRef ds:uri="http://purl.org/dc/elements/1.1/"/>
+    <ds:schemaRef ds:uri="71af3243-3dd4-4a8d-8c0d-dd76da1f02a5"/>
+    <ds:schemaRef ds:uri="http://schemas.microsoft.com/office/2006/metadata/properties"/>
+    <ds:schemaRef ds:uri="http://www.w3.org/XML/1998/namespace"/>
+    <ds:schemaRef ds:uri="http://purl.org/dc/dcmitype/"/>
   </ds:schemaRefs>
 </ds:datastoreItem>
 </file>
</xml_diff>